<commit_message>
fixed that one line
</commit_message>
<xml_diff>
--- a/docs/Winter/FINALDEMOPRES.pptx
+++ b/docs/Winter/FINALDEMOPRES.pptx
@@ -24474,6 +24474,74 @@
           </a:p>
         </p:txBody>
       </p:sp>
+      <p:sp>
+        <p:nvSpPr>
+          <p:cNvPr id="15" name="TextBox 14">
+            <a:extLst>
+              <a:ext uri="{FF2B5EF4-FFF2-40B4-BE49-F238E27FC236}">
+                <a16:creationId xmlns:a16="http://schemas.microsoft.com/office/drawing/2014/main" id="{904D039A-D3AC-4106-9736-45A2583687A1}"/>
+              </a:ext>
+            </a:extLst>
+          </p:cNvPr>
+          <p:cNvSpPr txBox="1"/>
+          <p:nvPr/>
+        </p:nvSpPr>
+        <p:spPr>
+          <a:xfrm>
+            <a:off x="948978" y="4687291"/>
+            <a:ext cx="4180070" cy="369332"/>
+          </a:xfrm>
+          <a:prstGeom prst="rect">
+            <a:avLst/>
+          </a:prstGeom>
+          <a:noFill/>
+        </p:spPr>
+        <p:txBody>
+          <a:bodyPr wrap="square" rtlCol="0">
+            <a:spAutoFit/>
+          </a:bodyPr>
+          <a:lstStyle/>
+          <a:p>
+            <a:r>
+              <a:rPr lang="en-US" dirty="0">
+                <a:latin typeface="Times New Roman" panose="02020603050405020304" pitchFamily="18" charset="0"/>
+                <a:cs typeface="Times New Roman" panose="02020603050405020304" pitchFamily="18" charset="0"/>
+              </a:rPr>
+              <a:t>Node.JS Cognito AUTH</a:t>
+            </a:r>
+          </a:p>
+        </p:txBody>
+      </p:sp>
+      <p:pic>
+        <p:nvPicPr>
+          <p:cNvPr id="4" name="Picture 3">
+            <a:extLst>
+              <a:ext uri="{FF2B5EF4-FFF2-40B4-BE49-F238E27FC236}">
+                <a16:creationId xmlns:a16="http://schemas.microsoft.com/office/drawing/2014/main" id="{93B35044-0C8D-4D80-9BB9-2A3DFCDB50CD}"/>
+              </a:ext>
+            </a:extLst>
+          </p:cNvPr>
+          <p:cNvPicPr>
+            <a:picLocks noChangeAspect="1"/>
+          </p:cNvPicPr>
+          <p:nvPr/>
+        </p:nvPicPr>
+        <p:blipFill>
+          <a:blip r:embed="rId9"/>
+          <a:stretch>
+            <a:fillRect/>
+          </a:stretch>
+        </p:blipFill>
+        <p:spPr>
+          <a:xfrm>
+            <a:off x="5039316" y="2322503"/>
+            <a:ext cx="5829300" cy="2181225"/>
+          </a:xfrm>
+          <a:prstGeom prst="rect">
+            <a:avLst/>
+          </a:prstGeom>
+        </p:spPr>
+      </p:pic>
     </p:spTree>
     <p:extLst>
       <p:ext uri="{BB962C8B-B14F-4D97-AF65-F5344CB8AC3E}">
@@ -25023,6 +25091,159 @@
                       </p:childTnLst>
                     </p:cTn>
                   </p:par>
+                  <p:par>
+                    <p:cTn id="45" fill="hold">
+                      <p:stCondLst>
+                        <p:cond delay="indefinite"/>
+                      </p:stCondLst>
+                      <p:childTnLst>
+                        <p:par>
+                          <p:cTn id="46" fill="hold">
+                            <p:stCondLst>
+                              <p:cond delay="0"/>
+                            </p:stCondLst>
+                            <p:childTnLst>
+                              <p:par>
+                                <p:cTn id="47" presetID="1" presetClass="exit" presetSubtype="0" fill="hold" grpId="1" nodeType="clickEffect">
+                                  <p:stCondLst>
+                                    <p:cond delay="0"/>
+                                  </p:stCondLst>
+                                  <p:childTnLst>
+                                    <p:set>
+                                      <p:cBhvr>
+                                        <p:cTn id="48" dur="1" fill="hold">
+                                          <p:stCondLst>
+                                            <p:cond delay="0"/>
+                                          </p:stCondLst>
+                                        </p:cTn>
+                                        <p:tgtEl>
+                                          <p:spTgt spid="28"/>
+                                        </p:tgtEl>
+                                        <p:attrNameLst>
+                                          <p:attrName>style.visibility</p:attrName>
+                                        </p:attrNameLst>
+                                      </p:cBhvr>
+                                      <p:to>
+                                        <p:strVal val="hidden"/>
+                                      </p:to>
+                                    </p:set>
+                                  </p:childTnLst>
+                                </p:cTn>
+                              </p:par>
+                              <p:par>
+                                <p:cTn id="49" presetID="1" presetClass="exit" presetSubtype="0" fill="hold" nodeType="withEffect">
+                                  <p:stCondLst>
+                                    <p:cond delay="0"/>
+                                  </p:stCondLst>
+                                  <p:childTnLst>
+                                    <p:set>
+                                      <p:cBhvr>
+                                        <p:cTn id="50" dur="1" fill="hold">
+                                          <p:stCondLst>
+                                            <p:cond delay="0"/>
+                                          </p:stCondLst>
+                                        </p:cTn>
+                                        <p:tgtEl>
+                                          <p:spTgt spid="27"/>
+                                        </p:tgtEl>
+                                        <p:attrNameLst>
+                                          <p:attrName>style.visibility</p:attrName>
+                                        </p:attrNameLst>
+                                      </p:cBhvr>
+                                      <p:to>
+                                        <p:strVal val="hidden"/>
+                                      </p:to>
+                                    </p:set>
+                                  </p:childTnLst>
+                                </p:cTn>
+                              </p:par>
+                              <p:par>
+                                <p:cTn id="51" presetID="1" presetClass="exit" presetSubtype="0" fill="hold" nodeType="withEffect">
+                                  <p:stCondLst>
+                                    <p:cond delay="0"/>
+                                  </p:stCondLst>
+                                  <p:childTnLst>
+                                    <p:set>
+                                      <p:cBhvr>
+                                        <p:cTn id="52" dur="1" fill="hold">
+                                          <p:stCondLst>
+                                            <p:cond delay="0"/>
+                                          </p:stCondLst>
+                                        </p:cTn>
+                                        <p:tgtEl>
+                                          <p:spTgt spid="25"/>
+                                        </p:tgtEl>
+                                        <p:attrNameLst>
+                                          <p:attrName>style.visibility</p:attrName>
+                                        </p:attrNameLst>
+                                      </p:cBhvr>
+                                      <p:to>
+                                        <p:strVal val="hidden"/>
+                                      </p:to>
+                                    </p:set>
+                                  </p:childTnLst>
+                                </p:cTn>
+                              </p:par>
+                              <p:par>
+                                <p:cTn id="53" presetID="1" presetClass="entr" presetSubtype="0" fill="hold" grpId="0" nodeType="withEffect">
+                                  <p:stCondLst>
+                                    <p:cond delay="0"/>
+                                  </p:stCondLst>
+                                  <p:childTnLst>
+                                    <p:set>
+                                      <p:cBhvr>
+                                        <p:cTn id="54" dur="1" fill="hold">
+                                          <p:stCondLst>
+                                            <p:cond delay="0"/>
+                                          </p:stCondLst>
+                                        </p:cTn>
+                                        <p:tgtEl>
+                                          <p:spTgt spid="15"/>
+                                        </p:tgtEl>
+                                        <p:attrNameLst>
+                                          <p:attrName>style.visibility</p:attrName>
+                                        </p:attrNameLst>
+                                      </p:cBhvr>
+                                      <p:to>
+                                        <p:strVal val="visible"/>
+                                      </p:to>
+                                    </p:set>
+                                  </p:childTnLst>
+                                </p:cTn>
+                              </p:par>
+                              <p:par>
+                                <p:cTn id="55" presetID="1" presetClass="entr" presetSubtype="0" fill="hold" nodeType="withEffect">
+                                  <p:stCondLst>
+                                    <p:cond delay="0"/>
+                                  </p:stCondLst>
+                                  <p:childTnLst>
+                                    <p:set>
+                                      <p:cBhvr>
+                                        <p:cTn id="56" dur="1" fill="hold">
+                                          <p:stCondLst>
+                                            <p:cond delay="0"/>
+                                          </p:stCondLst>
+                                        </p:cTn>
+                                        <p:tgtEl>
+                                          <p:spTgt spid="4"/>
+                                        </p:tgtEl>
+                                        <p:attrNameLst>
+                                          <p:attrName>style.visibility</p:attrName>
+                                        </p:attrNameLst>
+                                      </p:cBhvr>
+                                      <p:to>
+                                        <p:strVal val="visible"/>
+                                      </p:to>
+                                    </p:set>
+                                  </p:childTnLst>
+                                </p:cTn>
+                              </p:par>
+                            </p:childTnLst>
+                          </p:cTn>
+                        </p:par>
+                      </p:childTnLst>
+                    </p:cTn>
+                  </p:par>
                 </p:childTnLst>
               </p:cTn>
               <p:prevCondLst>
@@ -25052,6 +25273,8 @@
       <p:bldP spid="23" grpId="0"/>
       <p:bldP spid="23" grpId="1"/>
       <p:bldP spid="28" grpId="0"/>
+      <p:bldP spid="28" grpId="1"/>
+      <p:bldP spid="15" grpId="0"/>
     </p:bldLst>
   </p:timing>
 </p:sld>

</xml_diff>